<commit_message>
Small corrections in report
</commit_message>
<xml_diff>
--- a/Exploratory Analysis.pptx
+++ b/Exploratory Analysis.pptx
@@ -5142,11 +5142,15 @@
           <a:p>
             <a:r>
               <a:rPr lang="en-US" dirty="0" smtClean="0"/>
-              <a:t>Average Pickups by </a:t>
-            </a:r>
-            <a:r>
-              <a:rPr lang="en-US" dirty="0" smtClean="0"/>
-              <a:t>Day (April)</a:t>
+              <a:t>Average Pickups </a:t>
+            </a:r>
+            <a:r>
+              <a:rPr lang="en-US" smtClean="0"/>
+              <a:t>by </a:t>
+            </a:r>
+            <a:r>
+              <a:rPr lang="en-US" smtClean="0"/>
+              <a:t>Day</a:t>
             </a:r>
             <a:endParaRPr lang="en-US" dirty="0"/>
           </a:p>

</xml_diff>